<commit_message>
fix 4 day ruzavas
</commit_message>
<xml_diff>
--- a/paskaitu-skaidres/6.0-javascript_language-from-university.pptx
+++ b/paskaitu-skaidres/6.0-javascript_language-from-university.pptx
@@ -180,7 +180,7 @@
   </p:defaultTextStyle>
   <p:extLst>
     <p:ext uri="{EFAFB233-063F-42B5-8137-9DF3F51BA10A}">
-      <p15:sldGuideLst xmlns:p15="http://schemas.microsoft.com/office/powerpoint/2012/main">
+      <p15:sldGuideLst xmlns:p15="http://schemas.microsoft.com/office/powerpoint/2012/main" xmlns="">
         <p15:guide id="1" orient="horz" pos="2160">
           <p15:clr>
             <a:srgbClr val="A4A3A4"/>
@@ -279,7 +279,8 @@
           <a:p>
             <a:fld id="{EF371F33-81EE-E94F-B694-012342161BD7}" type="datetimeFigureOut">
               <a:rPr lang="en-US" smtClean="0"/>
-              <a:t>5/5/17</a:t>
+              <a:pPr/>
+              <a:t>1/29/2019</a:t>
             </a:fld>
             <a:endParaRPr lang="en-US"/>
           </a:p>
@@ -438,6 +439,7 @@
           <a:p>
             <a:fld id="{2E58CE0B-0D0D-0C46-857B-6D263A20310C}" type="slidenum">
               <a:rPr lang="en-US" smtClean="0"/>
+              <a:pPr/>
               <a:t>‹#›</a:t>
             </a:fld>
             <a:endParaRPr lang="en-US"/>
@@ -447,7 +449,7 @@
     </p:spTree>
     <p:extLst>
       <p:ext uri="{BB962C8B-B14F-4D97-AF65-F5344CB8AC3E}">
-        <p14:creationId xmlns:p14="http://schemas.microsoft.com/office/powerpoint/2010/main" val="128033113"/>
+        <p14:creationId xmlns:p14="http://schemas.microsoft.com/office/powerpoint/2010/main" xmlns="" val="128033113"/>
       </p:ext>
     </p:extLst>
   </p:cSld>
@@ -586,14 +588,14 @@
           </a:ln>
           <a:extLst>
             <a:ext uri="{909E8E84-426E-40DD-AFC4-6F175D3DCCD1}">
-              <a14:hiddenFill xmlns:a14="http://schemas.microsoft.com/office/drawing/2010/main">
+              <a14:hiddenFill xmlns:a14="http://schemas.microsoft.com/office/drawing/2010/main" xmlns="">
                 <a:solidFill>
                   <a:srgbClr val="FFFFFF"/>
                 </a:solidFill>
               </a14:hiddenFill>
             </a:ext>
             <a:ext uri="{FAA26D3D-D897-4be2-8F04-BA451C77F1D7}">
-              <ma14:placeholderFlag xmlns:ma14="http://schemas.microsoft.com/office/mac/drawingml/2011/main" val="1"/>
+              <ma14:placeholderFlag xmlns:ma14="http://schemas.microsoft.com/office/mac/drawingml/2011/main" xmlns="" val="1"/>
             </a:ext>
           </a:extLst>
         </p:spPr>
@@ -612,14 +614,14 @@
           <a:noFill/>
           <a:extLst>
             <a:ext uri="{909E8E84-426E-40DD-AFC4-6F175D3DCCD1}">
-              <a14:hiddenFill xmlns:a14="http://schemas.microsoft.com/office/drawing/2010/main">
+              <a14:hiddenFill xmlns:a14="http://schemas.microsoft.com/office/drawing/2010/main" xmlns="">
                 <a:solidFill>
                   <a:srgbClr val="FFFFFF"/>
                 </a:solidFill>
               </a14:hiddenFill>
             </a:ext>
             <a:ext uri="{91240B29-F687-4F45-9708-019B960494DF}">
-              <a14:hiddenLine xmlns:a14="http://schemas.microsoft.com/office/drawing/2010/main" w="9525">
+              <a14:hiddenLine xmlns:a14="http://schemas.microsoft.com/office/drawing/2010/main" xmlns="" w="9525">
                 <a:solidFill>
                   <a:srgbClr val="000000"/>
                 </a:solidFill>
@@ -659,14 +661,14 @@
           <a:noFill/>
           <a:extLst>
             <a:ext uri="{909E8E84-426E-40DD-AFC4-6F175D3DCCD1}">
-              <a14:hiddenFill xmlns:a14="http://schemas.microsoft.com/office/drawing/2010/main">
+              <a14:hiddenFill xmlns:a14="http://schemas.microsoft.com/office/drawing/2010/main" xmlns="">
                 <a:solidFill>
                   <a:srgbClr val="FFFFFF"/>
                 </a:solidFill>
               </a14:hiddenFill>
             </a:ext>
             <a:ext uri="{91240B29-F687-4F45-9708-019B960494DF}">
-              <a14:hiddenLine xmlns:a14="http://schemas.microsoft.com/office/drawing/2010/main" w="9525">
+              <a14:hiddenLine xmlns:a14="http://schemas.microsoft.com/office/drawing/2010/main" xmlns="" w="9525">
                 <a:solidFill>
                   <a:srgbClr val="000000"/>
                 </a:solidFill>
@@ -809,7 +811,7 @@
     </p:spTree>
     <p:extLst>
       <p:ext uri="{BB962C8B-B14F-4D97-AF65-F5344CB8AC3E}">
-        <p14:creationId xmlns:p14="http://schemas.microsoft.com/office/powerpoint/2010/main" val="270109551"/>
+        <p14:creationId xmlns:p14="http://schemas.microsoft.com/office/powerpoint/2010/main" xmlns="" val="270109551"/>
       </p:ext>
     </p:extLst>
   </p:cSld>
@@ -1220,7 +1222,7 @@
     </p:spTree>
     <p:extLst>
       <p:ext uri="{BB962C8B-B14F-4D97-AF65-F5344CB8AC3E}">
-        <p14:creationId xmlns:p14="http://schemas.microsoft.com/office/powerpoint/2010/main" val="2131151388"/>
+        <p14:creationId xmlns:p14="http://schemas.microsoft.com/office/powerpoint/2010/main" xmlns="" val="2131151388"/>
       </p:ext>
     </p:extLst>
   </p:cSld>
@@ -2442,102 +2444,10 @@
           </a:p>
         </p:txBody>
       </p:sp>
-      <p:grpSp>
-        <p:nvGrpSpPr>
-          <p:cNvPr id="4" name="Group 6"/>
-          <p:cNvGrpSpPr>
-            <a:grpSpLocks/>
-          </p:cNvGrpSpPr>
-          <p:nvPr/>
-        </p:nvGrpSpPr>
-        <p:grpSpPr bwMode="auto">
-          <a:xfrm>
-            <a:off x="7596188" y="115888"/>
-            <a:ext cx="1081087" cy="1254125"/>
-            <a:chOff x="423" y="2976"/>
-            <a:chExt cx="951" cy="1055"/>
-          </a:xfrm>
-        </p:grpSpPr>
-        <p:pic>
-          <p:nvPicPr>
-            <p:cNvPr id="5" name="Picture 7" descr="cherubino"/>
-            <p:cNvPicPr>
-              <a:picLocks noChangeAspect="1" noChangeArrowheads="1"/>
-            </p:cNvPicPr>
-            <p:nvPr/>
-          </p:nvPicPr>
-          <p:blipFill>
-            <a:blip r:embed="rId2" cstate="print"/>
-            <a:srcRect/>
-            <a:stretch>
-              <a:fillRect/>
-            </a:stretch>
-          </p:blipFill>
-          <p:spPr bwMode="auto">
-            <a:xfrm>
-              <a:off x="470" y="2976"/>
-              <a:ext cx="822" cy="888"/>
-            </a:xfrm>
-            <a:prstGeom prst="rect">
-              <a:avLst/>
-            </a:prstGeom>
-            <a:noFill/>
-            <a:ln w="9525">
-              <a:noFill/>
-              <a:miter lim="800000"/>
-              <a:headEnd/>
-              <a:tailEnd/>
-            </a:ln>
-          </p:spPr>
-        </p:pic>
-        <p:sp>
-          <p:nvSpPr>
-            <p:cNvPr id="6" name="Text Box 8"/>
-            <p:cNvSpPr txBox="1">
-              <a:spLocks noChangeArrowheads="1"/>
-            </p:cNvSpPr>
-            <p:nvPr/>
-          </p:nvSpPr>
-          <p:spPr bwMode="auto">
-            <a:xfrm>
-              <a:off x="423" y="3839"/>
-              <a:ext cx="951" cy="192"/>
-            </a:xfrm>
-            <a:prstGeom prst="rect">
-              <a:avLst/>
-            </a:prstGeom>
-            <a:noFill/>
-            <a:ln w="9525">
-              <a:noFill/>
-              <a:miter lim="800000"/>
-              <a:headEnd/>
-              <a:tailEnd/>
-            </a:ln>
-          </p:spPr>
-          <p:txBody>
-            <a:bodyPr wrap="none">
-              <a:spAutoFit/>
-            </a:bodyPr>
-            <a:lstStyle/>
-            <a:p>
-              <a:pPr eaLnBrk="1" hangingPunct="1"/>
-              <a:r>
-                <a:rPr lang="en-US" sz="900">
-                  <a:solidFill>
-                    <a:srgbClr val="006699"/>
-                  </a:solidFill>
-                  <a:latin typeface="Palatino Linotype" pitchFamily="18" charset="0"/>
-                </a:rPr>
-                <a:t>Università di Pisa</a:t>
-              </a:r>
-            </a:p>
-          </p:txBody>
-        </p:sp>
-      </p:grpSp>
     </p:spTree>
     <p:extLst>
       <p:ext uri="{BB962C8B-B14F-4D97-AF65-F5344CB8AC3E}">
-        <p14:creationId xmlns:p14="http://schemas.microsoft.com/office/powerpoint/2010/main" val="2855703316"/>
+        <p14:creationId xmlns:p14="http://schemas.microsoft.com/office/powerpoint/2010/main" xmlns="" val="2855703316"/>
       </p:ext>
     </p:extLst>
   </p:cSld>
@@ -2668,7 +2578,7 @@
     </p:spTree>
     <p:extLst>
       <p:ext uri="{BB962C8B-B14F-4D97-AF65-F5344CB8AC3E}">
-        <p14:creationId xmlns:p14="http://schemas.microsoft.com/office/powerpoint/2010/main" val="3772885554"/>
+        <p14:creationId xmlns:p14="http://schemas.microsoft.com/office/powerpoint/2010/main" xmlns="" val="3772885554"/>
       </p:ext>
     </p:extLst>
   </p:cSld>
@@ -3072,7 +2982,7 @@
     </p:spTree>
     <p:extLst>
       <p:ext uri="{BB962C8B-B14F-4D97-AF65-F5344CB8AC3E}">
-        <p14:creationId xmlns:p14="http://schemas.microsoft.com/office/powerpoint/2010/main" val="2763053975"/>
+        <p14:creationId xmlns:p14="http://schemas.microsoft.com/office/powerpoint/2010/main" xmlns="" val="2763053975"/>
       </p:ext>
     </p:extLst>
   </p:cSld>
@@ -3475,7 +3385,7 @@
     </p:spTree>
     <p:extLst>
       <p:ext uri="{BB962C8B-B14F-4D97-AF65-F5344CB8AC3E}">
-        <p14:creationId xmlns:p14="http://schemas.microsoft.com/office/powerpoint/2010/main" val="1405201121"/>
+        <p14:creationId xmlns:p14="http://schemas.microsoft.com/office/powerpoint/2010/main" xmlns="" val="1405201121"/>
       </p:ext>
     </p:extLst>
   </p:cSld>
@@ -3954,7 +3864,7 @@
     </p:spTree>
     <p:extLst>
       <p:ext uri="{BB962C8B-B14F-4D97-AF65-F5344CB8AC3E}">
-        <p14:creationId xmlns:p14="http://schemas.microsoft.com/office/powerpoint/2010/main" val="495072233"/>
+        <p14:creationId xmlns:p14="http://schemas.microsoft.com/office/powerpoint/2010/main" xmlns="" val="495072233"/>
       </p:ext>
     </p:extLst>
   </p:cSld>
@@ -4012,7 +3922,7 @@
       </p:sp>
       <p:sp>
         <p:nvSpPr>
-          <p:cNvPr id="12291" name="Rectangle 9" descr="Rectangle: Click to edit Master text styles&#13;&#10;Second level&#13;&#10;Third level&#13;&#10;Fourth level&#13;&#10;Fifth level"/>
+          <p:cNvPr id="12291" name="Rectangle 9" descr="Rectangle: Click to edit Master text styles&#10;Second level&#10;Third level&#10;Fourth level&#10;Fifth level"/>
           <p:cNvSpPr>
             <a:spLocks noGrp="1" noChangeArrowheads="1"/>
           </p:cNvSpPr>
@@ -4199,7 +4109,7 @@
     </p:spTree>
     <p:extLst>
       <p:ext uri="{BB962C8B-B14F-4D97-AF65-F5344CB8AC3E}">
-        <p14:creationId xmlns:p14="http://schemas.microsoft.com/office/powerpoint/2010/main" val="1347458929"/>
+        <p14:creationId xmlns:p14="http://schemas.microsoft.com/office/powerpoint/2010/main" xmlns="" val="1347458929"/>
       </p:ext>
     </p:extLst>
   </p:cSld>
@@ -4207,7 +4117,7 @@
     <a:masterClrMapping/>
   </p:clrMapOvr>
   <mc:AlternateContent xmlns:mc="http://schemas.openxmlformats.org/markup-compatibility/2006">
-    <mc:Choice xmlns:p14="http://schemas.microsoft.com/office/powerpoint/2010/main" Requires="p14">
+    <mc:Choice xmlns:p14="http://schemas.microsoft.com/office/powerpoint/2010/main" xmlns="" Requires="p14">
       <p:transition spd="slow" p14:dur="2000"/>
     </mc:Choice>
     <mc:Fallback>
@@ -4277,7 +4187,7 @@
           <a:blip r:embed="rId2">
             <a:extLst>
               <a:ext uri="{28A0092B-C50C-407E-A947-70E740481C1C}">
-                <a14:useLocalDpi xmlns:a14="http://schemas.microsoft.com/office/drawing/2010/main" val="0"/>
+                <a14:useLocalDpi xmlns:a14="http://schemas.microsoft.com/office/drawing/2010/main" xmlns="" val="0"/>
               </a:ext>
             </a:extLst>
           </a:blip>
@@ -4346,7 +4256,7 @@
     </p:spTree>
     <p:extLst>
       <p:ext uri="{BB962C8B-B14F-4D97-AF65-F5344CB8AC3E}">
-        <p14:creationId xmlns:p14="http://schemas.microsoft.com/office/powerpoint/2010/main" val="1527162088"/>
+        <p14:creationId xmlns:p14="http://schemas.microsoft.com/office/powerpoint/2010/main" xmlns="" val="1527162088"/>
       </p:ext>
     </p:extLst>
   </p:cSld>
@@ -4354,7 +4264,7 @@
     <a:masterClrMapping/>
   </p:clrMapOvr>
   <mc:AlternateContent xmlns:mc="http://schemas.openxmlformats.org/markup-compatibility/2006">
-    <mc:Choice xmlns:p14="http://schemas.microsoft.com/office/powerpoint/2010/main" Requires="p14">
+    <mc:Choice xmlns:p14="http://schemas.microsoft.com/office/powerpoint/2010/main" xmlns="" Requires="p14">
       <p:transition spd="slow" p14:dur="2000"/>
     </mc:Choice>
     <mc:Fallback>
@@ -4410,14 +4320,14 @@
           <a:ln/>
           <a:extLst>
             <a:ext uri="{909E8E84-426E-40DD-AFC4-6F175D3DCCD1}">
-              <a14:hiddenFill xmlns:a14="http://schemas.microsoft.com/office/drawing/2010/main">
+              <a14:hiddenFill xmlns:a14="http://schemas.microsoft.com/office/drawing/2010/main" xmlns="">
                 <a:solidFill>
                   <a:srgbClr val="FFFFFF"/>
                 </a:solidFill>
               </a14:hiddenFill>
             </a:ext>
             <a:ext uri="{91240B29-F687-4F45-9708-019B960494DF}">
-              <a14:hiddenLine xmlns:a14="http://schemas.microsoft.com/office/drawing/2010/main" w="9525">
+              <a14:hiddenLine xmlns:a14="http://schemas.microsoft.com/office/drawing/2010/main" xmlns="" w="9525">
                 <a:solidFill>
                   <a:srgbClr val="000000"/>
                 </a:solidFill>
@@ -5194,14 +5104,14 @@
           </a:ln>
           <a:extLst>
             <a:ext uri="{909E8E84-426E-40DD-AFC4-6F175D3DCCD1}">
-              <a14:hiddenFill xmlns:a14="http://schemas.microsoft.com/office/drawing/2010/main">
+              <a14:hiddenFill xmlns:a14="http://schemas.microsoft.com/office/drawing/2010/main" xmlns="">
                 <a:solidFill>
                   <a:srgbClr val="FFFFFF"/>
                 </a:solidFill>
               </a14:hiddenFill>
             </a:ext>
             <a:ext uri="{91240B29-F687-4F45-9708-019B960494DF}">
-              <a14:hiddenLine xmlns:a14="http://schemas.microsoft.com/office/drawing/2010/main" w="12700">
+              <a14:hiddenLine xmlns:a14="http://schemas.microsoft.com/office/drawing/2010/main" xmlns="" w="12700">
                 <a:solidFill>
                   <a:srgbClr val="000000"/>
                 </a:solidFill>
@@ -5355,7 +5265,7 @@
     </p:spTree>
     <p:extLst>
       <p:ext uri="{BB962C8B-B14F-4D97-AF65-F5344CB8AC3E}">
-        <p14:creationId xmlns:p14="http://schemas.microsoft.com/office/powerpoint/2010/main" val="288664072"/>
+        <p14:creationId xmlns:p14="http://schemas.microsoft.com/office/powerpoint/2010/main" xmlns="" val="288664072"/>
       </p:ext>
     </p:extLst>
   </p:cSld>
@@ -5363,7 +5273,7 @@
     <a:masterClrMapping/>
   </p:clrMapOvr>
   <mc:AlternateContent xmlns:mc="http://schemas.openxmlformats.org/markup-compatibility/2006">
-    <mc:Choice xmlns:p14="http://schemas.microsoft.com/office/powerpoint/2010/main" Requires="p14">
+    <mc:Choice xmlns:p14="http://schemas.microsoft.com/office/powerpoint/2010/main" xmlns="" Requires="p14">
       <p:transition spd="slow" p14:dur="2000"/>
     </mc:Choice>
     <mc:Fallback>
@@ -6037,7 +5947,7 @@
     </p:spTree>
     <p:extLst>
       <p:ext uri="{BB962C8B-B14F-4D97-AF65-F5344CB8AC3E}">
-        <p14:creationId xmlns:p14="http://schemas.microsoft.com/office/powerpoint/2010/main" val="813829571"/>
+        <p14:creationId xmlns:p14="http://schemas.microsoft.com/office/powerpoint/2010/main" xmlns="" val="813829571"/>
       </p:ext>
     </p:extLst>
   </p:cSld>
@@ -6130,11 +6040,7 @@
             </a:r>
             <a:r>
               <a:rPr lang="en-US" sz="2400" dirty="0" smtClean="0"/>
-              <a:t> </a:t>
-            </a:r>
-            <a:r>
-              <a:rPr lang="en-US" sz="2400" dirty="0" smtClean="0"/>
-              <a:t>= "</a:t>
+              <a:t> = "</a:t>
             </a:r>
             <a:r>
               <a:rPr lang="en-US" sz="2400" dirty="0" err="1" smtClean="0"/>
@@ -6229,7 +6135,7 @@
     </p:spTree>
     <p:extLst>
       <p:ext uri="{BB962C8B-B14F-4D97-AF65-F5344CB8AC3E}">
-        <p14:creationId xmlns:p14="http://schemas.microsoft.com/office/powerpoint/2010/main" val="1073566235"/>
+        <p14:creationId xmlns:p14="http://schemas.microsoft.com/office/powerpoint/2010/main" xmlns="" val="1073566235"/>
       </p:ext>
     </p:extLst>
   </p:cSld>
@@ -6313,7 +6219,7 @@
     </p:spTree>
     <p:extLst>
       <p:ext uri="{BB962C8B-B14F-4D97-AF65-F5344CB8AC3E}">
-        <p14:creationId xmlns:p14="http://schemas.microsoft.com/office/powerpoint/2010/main" val="556457329"/>
+        <p14:creationId xmlns:p14="http://schemas.microsoft.com/office/powerpoint/2010/main" xmlns="" val="556457329"/>
       </p:ext>
     </p:extLst>
   </p:cSld>
@@ -6362,14 +6268,14 @@
           <a:ln/>
           <a:extLst>
             <a:ext uri="{909E8E84-426E-40DD-AFC4-6F175D3DCCD1}">
-              <a14:hiddenFill xmlns:a14="http://schemas.microsoft.com/office/drawing/2010/main">
+              <a14:hiddenFill xmlns:a14="http://schemas.microsoft.com/office/drawing/2010/main" xmlns="">
                 <a:solidFill>
                   <a:srgbClr val="FFFFFF"/>
                 </a:solidFill>
               </a14:hiddenFill>
             </a:ext>
             <a:ext uri="{91240B29-F687-4F45-9708-019B960494DF}">
-              <a14:hiddenLine xmlns:a14="http://schemas.microsoft.com/office/drawing/2010/main" w="9525">
+              <a14:hiddenLine xmlns:a14="http://schemas.microsoft.com/office/drawing/2010/main" xmlns="" w="9525">
                 <a:solidFill>
                   <a:srgbClr val="000000"/>
                 </a:solidFill>
@@ -6664,7 +6570,7 @@
           <a:blip r:embed="rId2">
             <a:extLst>
               <a:ext uri="{28A0092B-C50C-407E-A947-70E740481C1C}">
-                <a14:useLocalDpi xmlns:a14="http://schemas.microsoft.com/office/drawing/2010/main" val="0"/>
+                <a14:useLocalDpi xmlns:a14="http://schemas.microsoft.com/office/drawing/2010/main" xmlns="" val="0"/>
               </a:ext>
             </a:extLst>
           </a:blip>
@@ -6687,14 +6593,14 @@
           </a:ln>
           <a:extLst>
             <a:ext uri="{909E8E84-426E-40DD-AFC4-6F175D3DCCD1}">
-              <a14:hiddenFill xmlns:a14="http://schemas.microsoft.com/office/drawing/2010/main">
+              <a14:hiddenFill xmlns:a14="http://schemas.microsoft.com/office/drawing/2010/main" xmlns="">
                 <a:solidFill>
                   <a:srgbClr val="FFFFFF"/>
                 </a:solidFill>
               </a14:hiddenFill>
             </a:ext>
             <a:ext uri="{91240B29-F687-4F45-9708-019B960494DF}">
-              <a14:hiddenLine xmlns:a14="http://schemas.microsoft.com/office/drawing/2010/main" w="28575">
+              <a14:hiddenLine xmlns:a14="http://schemas.microsoft.com/office/drawing/2010/main" xmlns="" w="28575">
                 <a:solidFill>
                   <a:srgbClr val="000000"/>
                 </a:solidFill>
@@ -6709,7 +6615,7 @@
     </p:spTree>
     <p:extLst>
       <p:ext uri="{BB962C8B-B14F-4D97-AF65-F5344CB8AC3E}">
-        <p14:creationId xmlns:p14="http://schemas.microsoft.com/office/powerpoint/2010/main" val="1639015596"/>
+        <p14:creationId xmlns:p14="http://schemas.microsoft.com/office/powerpoint/2010/main" xmlns="" val="1639015596"/>
       </p:ext>
     </p:extLst>
   </p:cSld>
@@ -6851,7 +6757,7 @@
     </p:spTree>
     <p:extLst>
       <p:ext uri="{BB962C8B-B14F-4D97-AF65-F5344CB8AC3E}">
-        <p14:creationId xmlns:p14="http://schemas.microsoft.com/office/powerpoint/2010/main" val="2885774448"/>
+        <p14:creationId xmlns:p14="http://schemas.microsoft.com/office/powerpoint/2010/main" xmlns="" val="2885774448"/>
       </p:ext>
     </p:extLst>
   </p:cSld>
@@ -6960,7 +6866,7 @@
     </p:spTree>
     <p:extLst>
       <p:ext uri="{BB962C8B-B14F-4D97-AF65-F5344CB8AC3E}">
-        <p14:creationId xmlns:p14="http://schemas.microsoft.com/office/powerpoint/2010/main" val="85955646"/>
+        <p14:creationId xmlns:p14="http://schemas.microsoft.com/office/powerpoint/2010/main" xmlns="" val="85955646"/>
       </p:ext>
     </p:extLst>
   </p:cSld>
@@ -7123,7 +7029,7 @@
     </p:spTree>
     <p:extLst>
       <p:ext uri="{BB962C8B-B14F-4D97-AF65-F5344CB8AC3E}">
-        <p14:creationId xmlns:p14="http://schemas.microsoft.com/office/powerpoint/2010/main" val="3851661133"/>
+        <p14:creationId xmlns:p14="http://schemas.microsoft.com/office/powerpoint/2010/main" xmlns="" val="3851661133"/>
       </p:ext>
     </p:extLst>
   </p:cSld>
@@ -7291,7 +7197,7 @@
     </p:spTree>
     <p:extLst>
       <p:ext uri="{BB962C8B-B14F-4D97-AF65-F5344CB8AC3E}">
-        <p14:creationId xmlns:p14="http://schemas.microsoft.com/office/powerpoint/2010/main" val="62774856"/>
+        <p14:creationId xmlns:p14="http://schemas.microsoft.com/office/powerpoint/2010/main" xmlns="" val="62774856"/>
       </p:ext>
     </p:extLst>
   </p:cSld>
@@ -7520,7 +7426,7 @@
     </p:spTree>
     <p:extLst>
       <p:ext uri="{BB962C8B-B14F-4D97-AF65-F5344CB8AC3E}">
-        <p14:creationId xmlns:p14="http://schemas.microsoft.com/office/powerpoint/2010/main" val="3498750487"/>
+        <p14:creationId xmlns:p14="http://schemas.microsoft.com/office/powerpoint/2010/main" xmlns="" val="3498750487"/>
       </p:ext>
     </p:extLst>
   </p:cSld>
@@ -7615,7 +7521,7 @@
     </p:spTree>
     <p:extLst>
       <p:ext uri="{BB962C8B-B14F-4D97-AF65-F5344CB8AC3E}">
-        <p14:creationId xmlns:p14="http://schemas.microsoft.com/office/powerpoint/2010/main" val="3419544298"/>
+        <p14:creationId xmlns:p14="http://schemas.microsoft.com/office/powerpoint/2010/main" xmlns="" val="3419544298"/>
       </p:ext>
     </p:extLst>
   </p:cSld>
@@ -7951,7 +7857,7 @@
     </p:spTree>
     <p:extLst>
       <p:ext uri="{BB962C8B-B14F-4D97-AF65-F5344CB8AC3E}">
-        <p14:creationId xmlns:p14="http://schemas.microsoft.com/office/powerpoint/2010/main" val="359611689"/>
+        <p14:creationId xmlns:p14="http://schemas.microsoft.com/office/powerpoint/2010/main" xmlns="" val="359611689"/>
       </p:ext>
     </p:extLst>
   </p:cSld>
@@ -8128,7 +8034,7 @@
     </p:spTree>
     <p:extLst>
       <p:ext uri="{BB962C8B-B14F-4D97-AF65-F5344CB8AC3E}">
-        <p14:creationId xmlns:p14="http://schemas.microsoft.com/office/powerpoint/2010/main" val="1963076541"/>
+        <p14:creationId xmlns:p14="http://schemas.microsoft.com/office/powerpoint/2010/main" xmlns="" val="1963076541"/>
       </p:ext>
     </p:extLst>
   </p:cSld>
@@ -8389,7 +8295,7 @@
     </p:spTree>
     <p:extLst>
       <p:ext uri="{BB962C8B-B14F-4D97-AF65-F5344CB8AC3E}">
-        <p14:creationId xmlns:p14="http://schemas.microsoft.com/office/powerpoint/2010/main" val="1579497169"/>
+        <p14:creationId xmlns:p14="http://schemas.microsoft.com/office/powerpoint/2010/main" xmlns="" val="1579497169"/>
       </p:ext>
     </p:extLst>
   </p:cSld>
@@ -8470,13 +8376,8 @@
             </a:pPr>
             <a:r>
               <a:rPr lang="en-US" sz="2400" dirty="0" smtClean="0"/>
-              <a:t>Anonymous functions </a:t>
-            </a:r>
-            <a:r>
-              <a:rPr lang="en-US" sz="2400" dirty="0" smtClean="0"/>
-              <a:t>in callbacks</a:t>
-            </a:r>
-            <a:endParaRPr lang="en-US" sz="2400" dirty="0" smtClean="0"/>
+              <a:t>Anonymous functions in callbacks</a:t>
+            </a:r>
           </a:p>
           <a:p>
             <a:pPr lvl="1" eaLnBrk="1" hangingPunct="1">
@@ -8721,7 +8622,7 @@
     </p:spTree>
     <p:extLst>
       <p:ext uri="{BB962C8B-B14F-4D97-AF65-F5344CB8AC3E}">
-        <p14:creationId xmlns:p14="http://schemas.microsoft.com/office/powerpoint/2010/main" val="1563558816"/>
+        <p14:creationId xmlns:p14="http://schemas.microsoft.com/office/powerpoint/2010/main" xmlns="" val="1563558816"/>
       </p:ext>
     </p:extLst>
   </p:cSld>
@@ -8916,7 +8817,7 @@
     </p:spTree>
     <p:extLst>
       <p:ext uri="{BB962C8B-B14F-4D97-AF65-F5344CB8AC3E}">
-        <p14:creationId xmlns:p14="http://schemas.microsoft.com/office/powerpoint/2010/main" val="3510596307"/>
+        <p14:creationId xmlns:p14="http://schemas.microsoft.com/office/powerpoint/2010/main" xmlns="" val="3510596307"/>
       </p:ext>
     </p:extLst>
   </p:cSld>
@@ -9306,7 +9207,7 @@
     </p:spTree>
     <p:extLst>
       <p:ext uri="{BB962C8B-B14F-4D97-AF65-F5344CB8AC3E}">
-        <p14:creationId xmlns:p14="http://schemas.microsoft.com/office/powerpoint/2010/main" val="2123115820"/>
+        <p14:creationId xmlns:p14="http://schemas.microsoft.com/office/powerpoint/2010/main" xmlns="" val="2123115820"/>
       </p:ext>
     </p:extLst>
   </p:cSld>
@@ -9483,7 +9384,7 @@
     </p:spTree>
     <p:extLst>
       <p:ext uri="{BB962C8B-B14F-4D97-AF65-F5344CB8AC3E}">
-        <p14:creationId xmlns:p14="http://schemas.microsoft.com/office/powerpoint/2010/main" val="619308188"/>
+        <p14:creationId xmlns:p14="http://schemas.microsoft.com/office/powerpoint/2010/main" xmlns="" val="619308188"/>
       </p:ext>
     </p:extLst>
   </p:cSld>
@@ -9716,7 +9617,7 @@
             </a:ln>
             <a:extLst>
               <a:ext uri="{909E8E84-426E-40DD-AFC4-6F175D3DCCD1}">
-                <a14:hiddenFill xmlns:a14="http://schemas.microsoft.com/office/drawing/2010/main">
+                <a14:hiddenFill xmlns:a14="http://schemas.microsoft.com/office/drawing/2010/main" xmlns="">
                   <a:solidFill>
                     <a:srgbClr val="FFFFFF"/>
                   </a:solidFill>
@@ -9959,7 +9860,7 @@
             </a:ln>
             <a:extLst>
               <a:ext uri="{909E8E84-426E-40DD-AFC4-6F175D3DCCD1}">
-                <a14:hiddenFill xmlns:a14="http://schemas.microsoft.com/office/drawing/2010/main">
+                <a14:hiddenFill xmlns:a14="http://schemas.microsoft.com/office/drawing/2010/main" xmlns="">
                   <a:solidFill>
                     <a:srgbClr val="FFFFFF"/>
                   </a:solidFill>
@@ -10019,7 +9920,7 @@
             </a:ln>
             <a:extLst>
               <a:ext uri="{909E8E84-426E-40DD-AFC4-6F175D3DCCD1}">
-                <a14:hiddenFill xmlns:a14="http://schemas.microsoft.com/office/drawing/2010/main">
+                <a14:hiddenFill xmlns:a14="http://schemas.microsoft.com/office/drawing/2010/main" xmlns="">
                   <a:solidFill>
                     <a:srgbClr val="FFFFFF"/>
                   </a:solidFill>
@@ -10262,7 +10163,7 @@
             </a:ln>
             <a:extLst>
               <a:ext uri="{909E8E84-426E-40DD-AFC4-6F175D3DCCD1}">
-                <a14:hiddenFill xmlns:a14="http://schemas.microsoft.com/office/drawing/2010/main">
+                <a14:hiddenFill xmlns:a14="http://schemas.microsoft.com/office/drawing/2010/main" xmlns="">
                   <a:solidFill>
                     <a:srgbClr val="FFFFFF"/>
                   </a:solidFill>
@@ -10322,7 +10223,7 @@
             </a:ln>
             <a:extLst>
               <a:ext uri="{909E8E84-426E-40DD-AFC4-6F175D3DCCD1}">
-                <a14:hiddenFill xmlns:a14="http://schemas.microsoft.com/office/drawing/2010/main">
+                <a14:hiddenFill xmlns:a14="http://schemas.microsoft.com/office/drawing/2010/main" xmlns="">
                   <a:solidFill>
                     <a:srgbClr val="FFFFFF"/>
                   </a:solidFill>
@@ -10565,7 +10466,7 @@
             </a:ln>
             <a:extLst>
               <a:ext uri="{909E8E84-426E-40DD-AFC4-6F175D3DCCD1}">
-                <a14:hiddenFill xmlns:a14="http://schemas.microsoft.com/office/drawing/2010/main">
+                <a14:hiddenFill xmlns:a14="http://schemas.microsoft.com/office/drawing/2010/main" xmlns="">
                   <a:solidFill>
                     <a:srgbClr val="FFFFFF"/>
                   </a:solidFill>
@@ -10604,14 +10505,14 @@
           </a:ln>
           <a:extLst>
             <a:ext uri="{909E8E84-426E-40DD-AFC4-6F175D3DCCD1}">
-              <a14:hiddenFill xmlns:a14="http://schemas.microsoft.com/office/drawing/2010/main">
+              <a14:hiddenFill xmlns:a14="http://schemas.microsoft.com/office/drawing/2010/main" xmlns="">
                 <a:solidFill>
                   <a:srgbClr val="FFFFFF"/>
                 </a:solidFill>
               </a14:hiddenFill>
             </a:ext>
             <a:ext uri="{91240B29-F687-4F45-9708-019B960494DF}">
-              <a14:hiddenLine xmlns:a14="http://schemas.microsoft.com/office/drawing/2010/main" w="9525">
+              <a14:hiddenLine xmlns:a14="http://schemas.microsoft.com/office/drawing/2010/main" xmlns="" w="9525">
                 <a:solidFill>
                   <a:srgbClr val="000000"/>
                 </a:solidFill>
@@ -10803,7 +10704,7 @@
     </p:spTree>
     <p:extLst>
       <p:ext uri="{BB962C8B-B14F-4D97-AF65-F5344CB8AC3E}">
-        <p14:creationId xmlns:p14="http://schemas.microsoft.com/office/powerpoint/2010/main" val="2006962354"/>
+        <p14:creationId xmlns:p14="http://schemas.microsoft.com/office/powerpoint/2010/main" xmlns="" val="2006962354"/>
       </p:ext>
     </p:extLst>
   </p:cSld>
@@ -11977,7 +11878,7 @@
     </p:spTree>
     <p:extLst>
       <p:ext uri="{BB962C8B-B14F-4D97-AF65-F5344CB8AC3E}">
-        <p14:creationId xmlns:p14="http://schemas.microsoft.com/office/powerpoint/2010/main" val="4127216832"/>
+        <p14:creationId xmlns:p14="http://schemas.microsoft.com/office/powerpoint/2010/main" xmlns="" val="4127216832"/>
       </p:ext>
     </p:extLst>
   </p:cSld>
@@ -12302,7 +12203,7 @@
     </p:spTree>
     <p:extLst>
       <p:ext uri="{BB962C8B-B14F-4D97-AF65-F5344CB8AC3E}">
-        <p14:creationId xmlns:p14="http://schemas.microsoft.com/office/powerpoint/2010/main" val="963533623"/>
+        <p14:creationId xmlns:p14="http://schemas.microsoft.com/office/powerpoint/2010/main" xmlns="" val="963533623"/>
       </p:ext>
     </p:extLst>
   </p:cSld>
@@ -12519,7 +12420,7 @@
     </p:spTree>
     <p:extLst>
       <p:ext uri="{BB962C8B-B14F-4D97-AF65-F5344CB8AC3E}">
-        <p14:creationId xmlns:p14="http://schemas.microsoft.com/office/powerpoint/2010/main" val="490640249"/>
+        <p14:creationId xmlns:p14="http://schemas.microsoft.com/office/powerpoint/2010/main" xmlns="" val="490640249"/>
       </p:ext>
     </p:extLst>
   </p:cSld>
@@ -13112,7 +13013,7 @@
     </p:spTree>
     <p:extLst>
       <p:ext uri="{BB962C8B-B14F-4D97-AF65-F5344CB8AC3E}">
-        <p14:creationId xmlns:p14="http://schemas.microsoft.com/office/powerpoint/2010/main" val="2000944110"/>
+        <p14:creationId xmlns:p14="http://schemas.microsoft.com/office/powerpoint/2010/main" xmlns="" val="2000944110"/>
       </p:ext>
     </p:extLst>
   </p:cSld>
@@ -13288,11 +13189,7 @@
             </a:pPr>
             <a:r>
               <a:rPr lang="en-US" dirty="0" smtClean="0"/>
-              <a:t>Objects </a:t>
-            </a:r>
-            <a:r>
-              <a:rPr lang="en-US" dirty="0" smtClean="0"/>
-              <a:t>have prototypes, can be changed</a:t>
+              <a:t>Objects have prototypes, can be changed</a:t>
             </a:r>
           </a:p>
           <a:p>
@@ -13388,7 +13285,7 @@
     </p:spTree>
     <p:extLst>
       <p:ext uri="{BB962C8B-B14F-4D97-AF65-F5344CB8AC3E}">
-        <p14:creationId xmlns:p14="http://schemas.microsoft.com/office/powerpoint/2010/main" val="273744750"/>
+        <p14:creationId xmlns:p14="http://schemas.microsoft.com/office/powerpoint/2010/main" xmlns="" val="273744750"/>
       </p:ext>
     </p:extLst>
   </p:cSld>
@@ -13443,11 +13340,7 @@
             </a:r>
             <a:r>
               <a:rPr lang="en-US" dirty="0" smtClean="0"/>
-              <a:t>bjects </a:t>
-            </a:r>
-            <a:r>
-              <a:rPr lang="en-US" dirty="0" smtClean="0"/>
-              <a:t>(1)</a:t>
+              <a:t>bjects (1)</a:t>
             </a:r>
             <a:endParaRPr lang="en-US" dirty="0"/>
           </a:p>
@@ -13609,7 +13502,7 @@
     </p:spTree>
     <p:extLst>
       <p:ext uri="{BB962C8B-B14F-4D97-AF65-F5344CB8AC3E}">
-        <p14:creationId xmlns:p14="http://schemas.microsoft.com/office/powerpoint/2010/main" val="3296527475"/>
+        <p14:creationId xmlns:p14="http://schemas.microsoft.com/office/powerpoint/2010/main" xmlns="" val="3296527475"/>
       </p:ext>
     </p:extLst>
   </p:cSld>
@@ -14095,7 +13988,7 @@
     </p:spTree>
     <p:extLst>
       <p:ext uri="{BB962C8B-B14F-4D97-AF65-F5344CB8AC3E}">
-        <p14:creationId xmlns:p14="http://schemas.microsoft.com/office/powerpoint/2010/main" val="3423304719"/>
+        <p14:creationId xmlns:p14="http://schemas.microsoft.com/office/powerpoint/2010/main" xmlns="" val="3423304719"/>
       </p:ext>
     </p:extLst>
   </p:cSld>
@@ -14222,7 +14115,7 @@
     </p:spTree>
     <p:extLst>
       <p:ext uri="{BB962C8B-B14F-4D97-AF65-F5344CB8AC3E}">
-        <p14:creationId xmlns:p14="http://schemas.microsoft.com/office/powerpoint/2010/main" val="3969931520"/>
+        <p14:creationId xmlns:p14="http://schemas.microsoft.com/office/powerpoint/2010/main" xmlns="" val="3969931520"/>
       </p:ext>
     </p:extLst>
   </p:cSld>
@@ -14366,7 +14259,7 @@
     </p:spTree>
     <p:extLst>
       <p:ext uri="{BB962C8B-B14F-4D97-AF65-F5344CB8AC3E}">
-        <p14:creationId xmlns:p14="http://schemas.microsoft.com/office/powerpoint/2010/main" val="452491567"/>
+        <p14:creationId xmlns:p14="http://schemas.microsoft.com/office/powerpoint/2010/main" xmlns="" val="452491567"/>
       </p:ext>
     </p:extLst>
   </p:cSld>
@@ -15067,7 +14960,7 @@
     </p:spTree>
     <p:extLst>
       <p:ext uri="{BB962C8B-B14F-4D97-AF65-F5344CB8AC3E}">
-        <p14:creationId xmlns:p14="http://schemas.microsoft.com/office/powerpoint/2010/main" val="2102184777"/>
+        <p14:creationId xmlns:p14="http://schemas.microsoft.com/office/powerpoint/2010/main" xmlns="" val="2102184777"/>
       </p:ext>
     </p:extLst>
   </p:cSld>
@@ -15671,7 +15564,7 @@
     </p:spTree>
     <p:extLst>
       <p:ext uri="{BB962C8B-B14F-4D97-AF65-F5344CB8AC3E}">
-        <p14:creationId xmlns:p14="http://schemas.microsoft.com/office/powerpoint/2010/main" val="2950097232"/>
+        <p14:creationId xmlns:p14="http://schemas.microsoft.com/office/powerpoint/2010/main" xmlns="" val="2950097232"/>
       </p:ext>
     </p:extLst>
   </p:cSld>
@@ -15726,11 +15619,7 @@
             </a:r>
             <a:r>
               <a:rPr lang="en-US" dirty="0" smtClean="0"/>
-              <a:t>bjects </a:t>
-            </a:r>
-            <a:r>
-              <a:rPr lang="en-US" dirty="0" smtClean="0"/>
-              <a:t>(2)</a:t>
+              <a:t>bjects (2)</a:t>
             </a:r>
             <a:endParaRPr lang="en-US" dirty="0"/>
           </a:p>
@@ -15842,11 +15731,7 @@
           <a:p>
             <a:r>
               <a:rPr lang="en-US" dirty="0" smtClean="0"/>
-              <a:t>not </a:t>
-            </a:r>
-            <a:r>
-              <a:rPr lang="en-US" dirty="0" smtClean="0"/>
-              <a:t>classes</a:t>
+              <a:t>not classes</a:t>
             </a:r>
             <a:r>
               <a:rPr lang="mr-IN" smtClean="0"/>
@@ -15940,7 +15825,7 @@
     </p:spTree>
     <p:extLst>
       <p:ext uri="{BB962C8B-B14F-4D97-AF65-F5344CB8AC3E}">
-        <p14:creationId xmlns:p14="http://schemas.microsoft.com/office/powerpoint/2010/main" val="1634377838"/>
+        <p14:creationId xmlns:p14="http://schemas.microsoft.com/office/powerpoint/2010/main" xmlns="" val="1634377838"/>
       </p:ext>
     </p:extLst>
   </p:cSld>
@@ -16221,7 +16106,7 @@
     </p:spTree>
     <p:extLst>
       <p:ext uri="{BB962C8B-B14F-4D97-AF65-F5344CB8AC3E}">
-        <p14:creationId xmlns:p14="http://schemas.microsoft.com/office/powerpoint/2010/main" val="3421671732"/>
+        <p14:creationId xmlns:p14="http://schemas.microsoft.com/office/powerpoint/2010/main" xmlns="" val="3421671732"/>
       </p:ext>
     </p:extLst>
   </p:cSld>
@@ -16552,7 +16437,7 @@
     </p:spTree>
     <p:extLst>
       <p:ext uri="{BB962C8B-B14F-4D97-AF65-F5344CB8AC3E}">
-        <p14:creationId xmlns:p14="http://schemas.microsoft.com/office/powerpoint/2010/main" val="2913025136"/>
+        <p14:creationId xmlns:p14="http://schemas.microsoft.com/office/powerpoint/2010/main" xmlns="" val="2913025136"/>
       </p:ext>
     </p:extLst>
   </p:cSld>
@@ -16607,11 +16492,7 @@
             </a:r>
             <a:r>
               <a:rPr lang="en-US" dirty="0" smtClean="0"/>
-              <a:t>bject </a:t>
-            </a:r>
-            <a:r>
-              <a:rPr lang="en-US" dirty="0" smtClean="0"/>
-              <a:t>structure</a:t>
+              <a:t>bject structure</a:t>
             </a:r>
             <a:endParaRPr lang="en-US" dirty="0"/>
           </a:p>
@@ -16649,7 +16530,7 @@
     </p:spTree>
     <p:extLst>
       <p:ext uri="{BB962C8B-B14F-4D97-AF65-F5344CB8AC3E}">
-        <p14:creationId xmlns:p14="http://schemas.microsoft.com/office/powerpoint/2010/main" val="1758999638"/>
+        <p14:creationId xmlns:p14="http://schemas.microsoft.com/office/powerpoint/2010/main" xmlns="" val="1758999638"/>
       </p:ext>
     </p:extLst>
   </p:cSld>
@@ -17553,7 +17434,7 @@
     </p:spTree>
     <p:extLst>
       <p:ext uri="{BB962C8B-B14F-4D97-AF65-F5344CB8AC3E}">
-        <p14:creationId xmlns:p14="http://schemas.microsoft.com/office/powerpoint/2010/main" val="1245122928"/>
+        <p14:creationId xmlns:p14="http://schemas.microsoft.com/office/powerpoint/2010/main" xmlns="" val="1245122928"/>
       </p:ext>
     </p:extLst>
   </p:cSld>
@@ -17987,7 +17868,7 @@
     </p:spTree>
     <p:extLst>
       <p:ext uri="{BB962C8B-B14F-4D97-AF65-F5344CB8AC3E}">
-        <p14:creationId xmlns:p14="http://schemas.microsoft.com/office/powerpoint/2010/main" val="181602474"/>
+        <p14:creationId xmlns:p14="http://schemas.microsoft.com/office/powerpoint/2010/main" xmlns="" val="181602474"/>
       </p:ext>
     </p:extLst>
   </p:cSld>
@@ -18042,15 +17923,7 @@
             </a:r>
             <a:r>
               <a:rPr lang="en-US" dirty="0" smtClean="0"/>
-              <a:t>odifying </a:t>
-            </a:r>
-            <a:r>
-              <a:rPr lang="en-US" dirty="0" smtClean="0"/>
-              <a:t>vs </a:t>
-            </a:r>
-            <a:r>
-              <a:rPr lang="en-US" dirty="0" smtClean="0"/>
-              <a:t>Setting </a:t>
+              <a:t>odifying vs Setting </a:t>
             </a:r>
             <a:r>
               <a:rPr lang="en-US" dirty="0"/>
@@ -18594,7 +18467,7 @@
     </p:spTree>
     <p:extLst>
       <p:ext uri="{BB962C8B-B14F-4D97-AF65-F5344CB8AC3E}">
-        <p14:creationId xmlns:p14="http://schemas.microsoft.com/office/powerpoint/2010/main" val="770665180"/>
+        <p14:creationId xmlns:p14="http://schemas.microsoft.com/office/powerpoint/2010/main" xmlns="" val="770665180"/>
       </p:ext>
     </p:extLst>
   </p:cSld>
@@ -18739,7 +18612,7 @@
     </p:spTree>
     <p:extLst>
       <p:ext uri="{BB962C8B-B14F-4D97-AF65-F5344CB8AC3E}">
-        <p14:creationId xmlns:p14="http://schemas.microsoft.com/office/powerpoint/2010/main" val="3685210902"/>
+        <p14:creationId xmlns:p14="http://schemas.microsoft.com/office/powerpoint/2010/main" xmlns="" val="3685210902"/>
       </p:ext>
     </p:extLst>
   </p:cSld>
@@ -19231,7 +19104,7 @@
     </p:spTree>
     <p:extLst>
       <p:ext uri="{BB962C8B-B14F-4D97-AF65-F5344CB8AC3E}">
-        <p14:creationId xmlns:p14="http://schemas.microsoft.com/office/powerpoint/2010/main" val="2280946091"/>
+        <p14:creationId xmlns:p14="http://schemas.microsoft.com/office/powerpoint/2010/main" xmlns="" val="2280946091"/>
       </p:ext>
     </p:extLst>
   </p:cSld>
@@ -19320,7 +19193,7 @@
     </p:spTree>
     <p:extLst>
       <p:ext uri="{BB962C8B-B14F-4D97-AF65-F5344CB8AC3E}">
-        <p14:creationId xmlns:p14="http://schemas.microsoft.com/office/powerpoint/2010/main" val="2713658086"/>
+        <p14:creationId xmlns:p14="http://schemas.microsoft.com/office/powerpoint/2010/main" xmlns="" val="2713658086"/>
       </p:ext>
     </p:extLst>
   </p:cSld>
@@ -19404,7 +19277,7 @@
     </p:spTree>
     <p:extLst>
       <p:ext uri="{BB962C8B-B14F-4D97-AF65-F5344CB8AC3E}">
-        <p14:creationId xmlns:p14="http://schemas.microsoft.com/office/powerpoint/2010/main" val="62066838"/>
+        <p14:creationId xmlns:p14="http://schemas.microsoft.com/office/powerpoint/2010/main" xmlns="" val="62066838"/>
       </p:ext>
     </p:extLst>
   </p:cSld>
@@ -20092,7 +19965,7 @@
     </p:spTree>
     <p:extLst>
       <p:ext uri="{BB962C8B-B14F-4D97-AF65-F5344CB8AC3E}">
-        <p14:creationId xmlns:p14="http://schemas.microsoft.com/office/powerpoint/2010/main" val="3911847278"/>
+        <p14:creationId xmlns:p14="http://schemas.microsoft.com/office/powerpoint/2010/main" xmlns="" val="3911847278"/>
       </p:ext>
     </p:extLst>
   </p:cSld>
@@ -20143,11 +20016,7 @@
           <a:p>
             <a:r>
               <a:rPr lang="en-US" dirty="0" smtClean="0"/>
-              <a:t>Method </a:t>
-            </a:r>
-            <a:r>
-              <a:rPr lang="en-US" dirty="0" smtClean="0"/>
-              <a:t>Kinds</a:t>
+              <a:t>Method Kinds</a:t>
             </a:r>
             <a:endParaRPr lang="en-US" dirty="0"/>
           </a:p>
@@ -20502,7 +20371,7 @@
     </p:spTree>
     <p:extLst>
       <p:ext uri="{BB962C8B-B14F-4D97-AF65-F5344CB8AC3E}">
-        <p14:creationId xmlns:p14="http://schemas.microsoft.com/office/powerpoint/2010/main" val="1602762149"/>
+        <p14:creationId xmlns:p14="http://schemas.microsoft.com/office/powerpoint/2010/main" xmlns="" val="1602762149"/>
       </p:ext>
     </p:extLst>
   </p:cSld>
@@ -20556,15 +20425,7 @@
             </a:pPr>
             <a:r>
               <a:rPr lang="en-US" dirty="0" smtClean="0"/>
-              <a:t>JavaScript </a:t>
-            </a:r>
-            <a:r>
-              <a:rPr lang="en-US" dirty="0" smtClean="0"/>
-              <a:t>Functions </a:t>
-            </a:r>
-            <a:r>
-              <a:rPr lang="en-US" dirty="0" smtClean="0"/>
-              <a:t>and </a:t>
+              <a:t>JavaScript Functions and </a:t>
             </a:r>
             <a:r>
               <a:rPr lang="en-US" i="1" dirty="0" smtClean="0"/>
@@ -20765,7 +20626,7 @@
           </a:ln>
           <a:extLst>
             <a:ext uri="{91240B29-F687-4F45-9708-019B960494DF}">
-              <a14:hiddenLine xmlns:a14="http://schemas.microsoft.com/office/drawing/2010/main" w="9525">
+              <a14:hiddenLine xmlns:a14="http://schemas.microsoft.com/office/drawing/2010/main" xmlns="" w="9525">
                 <a:solidFill>
                   <a:srgbClr val="000000"/>
                 </a:solidFill>
@@ -20973,7 +20834,7 @@
     </p:spTree>
     <p:extLst>
       <p:ext uri="{BB962C8B-B14F-4D97-AF65-F5344CB8AC3E}">
-        <p14:creationId xmlns:p14="http://schemas.microsoft.com/office/powerpoint/2010/main" val="440316945"/>
+        <p14:creationId xmlns:p14="http://schemas.microsoft.com/office/powerpoint/2010/main" xmlns="" val="440316945"/>
       </p:ext>
     </p:extLst>
   </p:cSld>
@@ -21217,7 +21078,7 @@
     </p:spTree>
     <p:extLst>
       <p:ext uri="{BB962C8B-B14F-4D97-AF65-F5344CB8AC3E}">
-        <p14:creationId xmlns:p14="http://schemas.microsoft.com/office/powerpoint/2010/main" val="178247053"/>
+        <p14:creationId xmlns:p14="http://schemas.microsoft.com/office/powerpoint/2010/main" xmlns="" val="178247053"/>
       </p:ext>
     </p:extLst>
   </p:cSld>
@@ -21327,13 +21188,8 @@
             </a:r>
             <a:r>
               <a:rPr lang="en-US" altLang="en-US" dirty="0" smtClean="0"/>
-              <a:t> o = { x: </a:t>
-            </a:r>
-            <a:r>
-              <a:rPr lang="en-US" altLang="en-US" dirty="0" smtClean="0"/>
-              <a:t>10,</a:t>
-            </a:r>
-            <a:endParaRPr lang="en-US" altLang="en-US" dirty="0" smtClean="0"/>
+              <a:t> o = { x: 10,</a:t>
+            </a:r>
           </a:p>
           <a:p>
             <a:pPr lvl="1">
@@ -21448,7 +21304,7 @@
     </p:spTree>
     <p:extLst>
       <p:ext uri="{BB962C8B-B14F-4D97-AF65-F5344CB8AC3E}">
-        <p14:creationId xmlns:p14="http://schemas.microsoft.com/office/powerpoint/2010/main" val="58532206"/>
+        <p14:creationId xmlns:p14="http://schemas.microsoft.com/office/powerpoint/2010/main" xmlns="" val="58532206"/>
       </p:ext>
     </p:extLst>
   </p:cSld>
@@ -21938,7 +21794,7 @@
     </p:spTree>
     <p:extLst>
       <p:ext uri="{BB962C8B-B14F-4D97-AF65-F5344CB8AC3E}">
-        <p14:creationId xmlns:p14="http://schemas.microsoft.com/office/powerpoint/2010/main" val="203275916"/>
+        <p14:creationId xmlns:p14="http://schemas.microsoft.com/office/powerpoint/2010/main" xmlns="" val="203275916"/>
       </p:ext>
     </p:extLst>
   </p:cSld>
@@ -22165,7 +22021,7 @@
     </p:spTree>
     <p:extLst>
       <p:ext uri="{BB962C8B-B14F-4D97-AF65-F5344CB8AC3E}">
-        <p14:creationId xmlns:p14="http://schemas.microsoft.com/office/powerpoint/2010/main" val="1017511554"/>
+        <p14:creationId xmlns:p14="http://schemas.microsoft.com/office/powerpoint/2010/main" xmlns="" val="1017511554"/>
       </p:ext>
     </p:extLst>
   </p:cSld>
@@ -22336,7 +22192,7 @@
     </p:spTree>
     <p:extLst>
       <p:ext uri="{BB962C8B-B14F-4D97-AF65-F5344CB8AC3E}">
-        <p14:creationId xmlns:p14="http://schemas.microsoft.com/office/powerpoint/2010/main" val="4155624917"/>
+        <p14:creationId xmlns:p14="http://schemas.microsoft.com/office/powerpoint/2010/main" xmlns="" val="4155624917"/>
       </p:ext>
     </p:extLst>
   </p:cSld>
@@ -22654,7 +22510,7 @@
     </p:spTree>
     <p:extLst>
       <p:ext uri="{BB962C8B-B14F-4D97-AF65-F5344CB8AC3E}">
-        <p14:creationId xmlns:p14="http://schemas.microsoft.com/office/powerpoint/2010/main" val="1959321482"/>
+        <p14:creationId xmlns:p14="http://schemas.microsoft.com/office/powerpoint/2010/main" xmlns="" val="1959321482"/>
       </p:ext>
     </p:extLst>
   </p:cSld>
@@ -22869,7 +22725,7 @@
     </p:spTree>
     <p:extLst>
       <p:ext uri="{BB962C8B-B14F-4D97-AF65-F5344CB8AC3E}">
-        <p14:creationId xmlns:p14="http://schemas.microsoft.com/office/powerpoint/2010/main" val="801904876"/>
+        <p14:creationId xmlns:p14="http://schemas.microsoft.com/office/powerpoint/2010/main" xmlns="" val="801904876"/>
       </p:ext>
     </p:extLst>
   </p:cSld>
@@ -23087,7 +22943,7 @@
     </p:spTree>
     <p:extLst>
       <p:ext uri="{BB962C8B-B14F-4D97-AF65-F5344CB8AC3E}">
-        <p14:creationId xmlns:p14="http://schemas.microsoft.com/office/powerpoint/2010/main" val="7882360"/>
+        <p14:creationId xmlns:p14="http://schemas.microsoft.com/office/powerpoint/2010/main" xmlns="" val="7882360"/>
       </p:ext>
     </p:extLst>
   </p:cSld>
@@ -23403,7 +23259,7 @@
     </p:spTree>
     <p:extLst>
       <p:ext uri="{BB962C8B-B14F-4D97-AF65-F5344CB8AC3E}">
-        <p14:creationId xmlns:p14="http://schemas.microsoft.com/office/powerpoint/2010/main" val="1482322053"/>
+        <p14:creationId xmlns:p14="http://schemas.microsoft.com/office/powerpoint/2010/main" xmlns="" val="1482322053"/>
       </p:ext>
     </p:extLst>
   </p:cSld>
@@ -23663,7 +23519,7 @@
     </p:spTree>
     <p:extLst>
       <p:ext uri="{BB962C8B-B14F-4D97-AF65-F5344CB8AC3E}">
-        <p14:creationId xmlns:p14="http://schemas.microsoft.com/office/powerpoint/2010/main" val="428955924"/>
+        <p14:creationId xmlns:p14="http://schemas.microsoft.com/office/powerpoint/2010/main" xmlns="" val="428955924"/>
       </p:ext>
     </p:extLst>
   </p:cSld>
@@ -23842,7 +23698,7 @@
     </p:spTree>
     <p:extLst>
       <p:ext uri="{BB962C8B-B14F-4D97-AF65-F5344CB8AC3E}">
-        <p14:creationId xmlns:p14="http://schemas.microsoft.com/office/powerpoint/2010/main" val="974674365"/>
+        <p14:creationId xmlns:p14="http://schemas.microsoft.com/office/powerpoint/2010/main" xmlns="" val="974674365"/>
       </p:ext>
     </p:extLst>
   </p:cSld>
@@ -24049,7 +23905,7 @@
     </p:spTree>
     <p:extLst>
       <p:ext uri="{BB962C8B-B14F-4D97-AF65-F5344CB8AC3E}">
-        <p14:creationId xmlns:p14="http://schemas.microsoft.com/office/powerpoint/2010/main" val="346793239"/>
+        <p14:creationId xmlns:p14="http://schemas.microsoft.com/office/powerpoint/2010/main" xmlns="" val="346793239"/>
       </p:ext>
     </p:extLst>
   </p:cSld>
@@ -24359,7 +24215,7 @@
     </p:spTree>
     <p:extLst>
       <p:ext uri="{BB962C8B-B14F-4D97-AF65-F5344CB8AC3E}">
-        <p14:creationId xmlns:p14="http://schemas.microsoft.com/office/powerpoint/2010/main" val="283349915"/>
+        <p14:creationId xmlns:p14="http://schemas.microsoft.com/office/powerpoint/2010/main" xmlns="" val="283349915"/>
       </p:ext>
     </p:extLst>
   </p:cSld>
@@ -24606,7 +24462,7 @@
     </p:spTree>
     <p:extLst>
       <p:ext uri="{BB962C8B-B14F-4D97-AF65-F5344CB8AC3E}">
-        <p14:creationId xmlns:p14="http://schemas.microsoft.com/office/powerpoint/2010/main" val="1290776006"/>
+        <p14:creationId xmlns:p14="http://schemas.microsoft.com/office/powerpoint/2010/main" xmlns="" val="1290776006"/>
       </p:ext>
     </p:extLst>
   </p:cSld>
@@ -24748,7 +24604,7 @@
     </p:spTree>
     <p:extLst>
       <p:ext uri="{BB962C8B-B14F-4D97-AF65-F5344CB8AC3E}">
-        <p14:creationId xmlns:p14="http://schemas.microsoft.com/office/powerpoint/2010/main" val="997780193"/>
+        <p14:creationId xmlns:p14="http://schemas.microsoft.com/office/powerpoint/2010/main" xmlns="" val="997780193"/>
       </p:ext>
     </p:extLst>
   </p:cSld>
@@ -25176,7 +25032,7 @@
     </p:spTree>
     <p:extLst>
       <p:ext uri="{BB962C8B-B14F-4D97-AF65-F5344CB8AC3E}">
-        <p14:creationId xmlns:p14="http://schemas.microsoft.com/office/powerpoint/2010/main" val="3271379755"/>
+        <p14:creationId xmlns:p14="http://schemas.microsoft.com/office/powerpoint/2010/main" xmlns="" val="3271379755"/>
       </p:ext>
     </p:extLst>
   </p:cSld>
@@ -25350,7 +25206,7 @@
     </p:spTree>
     <p:extLst>
       <p:ext uri="{BB962C8B-B14F-4D97-AF65-F5344CB8AC3E}">
-        <p14:creationId xmlns:p14="http://schemas.microsoft.com/office/powerpoint/2010/main" val="1440726596"/>
+        <p14:creationId xmlns:p14="http://schemas.microsoft.com/office/powerpoint/2010/main" xmlns="" val="1440726596"/>
       </p:ext>
     </p:extLst>
   </p:cSld>
@@ -25686,7 +25542,7 @@
     </p:spTree>
     <p:extLst>
       <p:ext uri="{BB962C8B-B14F-4D97-AF65-F5344CB8AC3E}">
-        <p14:creationId xmlns:p14="http://schemas.microsoft.com/office/powerpoint/2010/main" val="3010847819"/>
+        <p14:creationId xmlns:p14="http://schemas.microsoft.com/office/powerpoint/2010/main" xmlns="" val="3010847819"/>
       </p:ext>
     </p:extLst>
   </p:cSld>
@@ -25895,7 +25751,7 @@
     </p:spTree>
     <p:extLst>
       <p:ext uri="{BB962C8B-B14F-4D97-AF65-F5344CB8AC3E}">
-        <p14:creationId xmlns:p14="http://schemas.microsoft.com/office/powerpoint/2010/main" val="192530848"/>
+        <p14:creationId xmlns:p14="http://schemas.microsoft.com/office/powerpoint/2010/main" xmlns="" val="192530848"/>
       </p:ext>
     </p:extLst>
   </p:cSld>
@@ -26091,7 +25947,7 @@
     </p:spTree>
     <p:extLst>
       <p:ext uri="{BB962C8B-B14F-4D97-AF65-F5344CB8AC3E}">
-        <p14:creationId xmlns:p14="http://schemas.microsoft.com/office/powerpoint/2010/main" val="2673026389"/>
+        <p14:creationId xmlns:p14="http://schemas.microsoft.com/office/powerpoint/2010/main" xmlns="" val="2673026389"/>
       </p:ext>
     </p:extLst>
   </p:cSld>
@@ -26207,7 +26063,7 @@
     </p:spTree>
     <p:extLst>
       <p:ext uri="{BB962C8B-B14F-4D97-AF65-F5344CB8AC3E}">
-        <p14:creationId xmlns:p14="http://schemas.microsoft.com/office/powerpoint/2010/main" val="1414818137"/>
+        <p14:creationId xmlns:p14="http://schemas.microsoft.com/office/powerpoint/2010/main" xmlns="" val="1414818137"/>
       </p:ext>
     </p:extLst>
   </p:cSld>
@@ -26741,7 +26597,7 @@
     </a:clrScheme>
     <a:fontScheme name="Office">
       <a:majorFont>
-        <a:latin typeface="Calibri Light" panose="020F0302020204030204"/>
+        <a:latin typeface="Calibri Light"/>
         <a:ea typeface=""/>
         <a:cs typeface=""/>
         <a:font script="Jpan" typeface="Yu Gothic Light"/>
@@ -26776,7 +26632,7 @@
         <a:font script="Geor" typeface="Sylfaen"/>
       </a:majorFont>
       <a:minorFont>
-        <a:latin typeface="Calibri" panose="020F0502020204030204"/>
+        <a:latin typeface="Calibri"/>
         <a:ea typeface=""/>
         <a:cs typeface=""/>
         <a:font script="Jpan" typeface="Yu Gothic"/>
@@ -26953,7 +26809,7 @@
   <a:extraClrSchemeLst/>
   <a:extLst>
     <a:ext uri="{05A4C25C-085E-4340-85A3-A5531E510DB2}">
-      <thm15:themeFamily xmlns:thm15="http://schemas.microsoft.com/office/thememl/2012/main" name="Office Theme" id="{62F939B6-93AF-4DB8-9C6B-D6C7DFDC589F}" vid="{4A3C46E8-61CC-4603-A589-7422A47A8E4A}"/>
+      <thm15:themeFamily xmlns:thm15="http://schemas.microsoft.com/office/thememl/2012/main" xmlns="" name="Office Theme" id="{62F939B6-93AF-4DB8-9C6B-D6C7DFDC589F}" vid="{4A3C46E8-61CC-4603-A589-7422A47A8E4A}"/>
     </a:ext>
   </a:extLst>
 </a:theme>

</xml_diff>